<commit_message>
RTI prediction for Norman
</commit_message>
<xml_diff>
--- a/Future presentation update.pptx
+++ b/Future presentation update.pptx
@@ -5,7 +5,7 @@
     <p:sldMasterId id="2147483648" r:id="rId1"/>
   </p:sldMasterIdLst>
   <p:notesMasterIdLst>
-    <p:notesMasterId r:id="rId22"/>
+    <p:notesMasterId r:id="rId24"/>
   </p:notesMasterIdLst>
   <p:sldIdLst>
     <p:sldId id="275" r:id="rId2"/>
@@ -28,6 +28,8 @@
     <p:sldId id="284" r:id="rId19"/>
     <p:sldId id="281" r:id="rId20"/>
     <p:sldId id="282" r:id="rId21"/>
+    <p:sldId id="285" r:id="rId22"/>
+    <p:sldId id="286" r:id="rId23"/>
   </p:sldIdLst>
   <p:sldSz cx="12192000" cy="6858000"/>
   <p:notesSz cx="6858000" cy="9144000"/>
@@ -985,6 +987,174 @@
     <p:extLst>
       <p:ext uri="{BB962C8B-B14F-4D97-AF65-F5344CB8AC3E}">
         <p14:creationId xmlns:p14="http://schemas.microsoft.com/office/powerpoint/2010/main" val="2873271718"/>
+      </p:ext>
+    </p:extLst>
+  </p:cSld>
+  <p:clrMapOvr>
+    <a:masterClrMapping/>
+  </p:clrMapOvr>
+</p:notes>
+</file>
+
+<file path=ppt/notesSlides/notesSlide6.xml><?xml version="1.0" encoding="utf-8"?>
+<p:notes xmlns:a="http://schemas.openxmlformats.org/drawingml/2006/main" xmlns:r="http://schemas.openxmlformats.org/officeDocument/2006/relationships" xmlns:p="http://schemas.openxmlformats.org/presentationml/2006/main">
+  <p:cSld>
+    <p:spTree>
+      <p:nvGrpSpPr>
+        <p:cNvPr id="1" name=""/>
+        <p:cNvGrpSpPr/>
+        <p:nvPr/>
+      </p:nvGrpSpPr>
+      <p:grpSpPr>
+        <a:xfrm>
+          <a:off x="0" y="0"/>
+          <a:ext cx="0" cy="0"/>
+          <a:chOff x="0" y="0"/>
+          <a:chExt cx="0" cy="0"/>
+        </a:xfrm>
+      </p:grpSpPr>
+      <p:sp>
+        <p:nvSpPr>
+          <p:cNvPr id="2" name="Slide Image Placeholder 1"/>
+          <p:cNvSpPr>
+            <a:spLocks noGrp="1" noRot="1" noChangeAspect="1"/>
+          </p:cNvSpPr>
+          <p:nvPr>
+            <p:ph type="sldImg"/>
+          </p:nvPr>
+        </p:nvSpPr>
+        <p:spPr/>
+      </p:sp>
+      <p:sp>
+        <p:nvSpPr>
+          <p:cNvPr id="3" name="Notes Placeholder 2"/>
+          <p:cNvSpPr>
+            <a:spLocks noGrp="1"/>
+          </p:cNvSpPr>
+          <p:nvPr>
+            <p:ph type="body" idx="1"/>
+          </p:nvPr>
+        </p:nvSpPr>
+        <p:spPr/>
+        <p:txBody>
+          <a:bodyPr/>
+          <a:lstStyle/>
+          <a:p>
+            <a:endParaRPr lang="en-US" dirty="0"/>
+          </a:p>
+        </p:txBody>
+      </p:sp>
+      <p:sp>
+        <p:nvSpPr>
+          <p:cNvPr id="4" name="Slide Number Placeholder 3"/>
+          <p:cNvSpPr>
+            <a:spLocks noGrp="1"/>
+          </p:cNvSpPr>
+          <p:nvPr>
+            <p:ph type="sldNum" sz="quarter" idx="5"/>
+          </p:nvPr>
+        </p:nvSpPr>
+        <p:spPr/>
+        <p:txBody>
+          <a:bodyPr/>
+          <a:lstStyle/>
+          <a:p>
+            <a:fld id="{1FFC93A7-B1F3-454A-A230-F9074DA5B0F9}" type="slidenum">
+              <a:rPr lang="en-US" smtClean="0"/>
+              <a:t>21</a:t>
+            </a:fld>
+            <a:endParaRPr lang="en-US"/>
+          </a:p>
+        </p:txBody>
+      </p:sp>
+    </p:spTree>
+    <p:extLst>
+      <p:ext uri="{BB962C8B-B14F-4D97-AF65-F5344CB8AC3E}">
+        <p14:creationId xmlns:p14="http://schemas.microsoft.com/office/powerpoint/2010/main" val="1326084250"/>
+      </p:ext>
+    </p:extLst>
+  </p:cSld>
+  <p:clrMapOvr>
+    <a:masterClrMapping/>
+  </p:clrMapOvr>
+</p:notes>
+</file>
+
+<file path=ppt/notesSlides/notesSlide7.xml><?xml version="1.0" encoding="utf-8"?>
+<p:notes xmlns:a="http://schemas.openxmlformats.org/drawingml/2006/main" xmlns:r="http://schemas.openxmlformats.org/officeDocument/2006/relationships" xmlns:p="http://schemas.openxmlformats.org/presentationml/2006/main">
+  <p:cSld>
+    <p:spTree>
+      <p:nvGrpSpPr>
+        <p:cNvPr id="1" name=""/>
+        <p:cNvGrpSpPr/>
+        <p:nvPr/>
+      </p:nvGrpSpPr>
+      <p:grpSpPr>
+        <a:xfrm>
+          <a:off x="0" y="0"/>
+          <a:ext cx="0" cy="0"/>
+          <a:chOff x="0" y="0"/>
+          <a:chExt cx="0" cy="0"/>
+        </a:xfrm>
+      </p:grpSpPr>
+      <p:sp>
+        <p:nvSpPr>
+          <p:cNvPr id="2" name="Slide Image Placeholder 1"/>
+          <p:cNvSpPr>
+            <a:spLocks noGrp="1" noRot="1" noChangeAspect="1"/>
+          </p:cNvSpPr>
+          <p:nvPr>
+            <p:ph type="sldImg"/>
+          </p:nvPr>
+        </p:nvSpPr>
+        <p:spPr/>
+      </p:sp>
+      <p:sp>
+        <p:nvSpPr>
+          <p:cNvPr id="3" name="Notes Placeholder 2"/>
+          <p:cNvSpPr>
+            <a:spLocks noGrp="1"/>
+          </p:cNvSpPr>
+          <p:nvPr>
+            <p:ph type="body" idx="1"/>
+          </p:nvPr>
+        </p:nvSpPr>
+        <p:spPr/>
+        <p:txBody>
+          <a:bodyPr/>
+          <a:lstStyle/>
+          <a:p>
+            <a:endParaRPr lang="en-US" dirty="0"/>
+          </a:p>
+        </p:txBody>
+      </p:sp>
+      <p:sp>
+        <p:nvSpPr>
+          <p:cNvPr id="4" name="Slide Number Placeholder 3"/>
+          <p:cNvSpPr>
+            <a:spLocks noGrp="1"/>
+          </p:cNvSpPr>
+          <p:nvPr>
+            <p:ph type="sldNum" sz="quarter" idx="5"/>
+          </p:nvPr>
+        </p:nvSpPr>
+        <p:spPr/>
+        <p:txBody>
+          <a:bodyPr/>
+          <a:lstStyle/>
+          <a:p>
+            <a:fld id="{1FFC93A7-B1F3-454A-A230-F9074DA5B0F9}" type="slidenum">
+              <a:rPr lang="en-US" smtClean="0"/>
+              <a:t>22</a:t>
+            </a:fld>
+            <a:endParaRPr lang="en-US"/>
+          </a:p>
+        </p:txBody>
+      </p:sp>
+    </p:spTree>
+    <p:extLst>
+      <p:ext uri="{BB962C8B-B14F-4D97-AF65-F5344CB8AC3E}">
+        <p14:creationId xmlns:p14="http://schemas.microsoft.com/office/powerpoint/2010/main" val="2130634335"/>
       </p:ext>
     </p:extLst>
   </p:cSld>
@@ -15017,6 +15187,281 @@
 </p:sld>
 </file>
 
+<file path=ppt/slides/slide21.xml><?xml version="1.0" encoding="utf-8"?>
+<p:sld xmlns:a="http://schemas.openxmlformats.org/drawingml/2006/main" xmlns:r="http://schemas.openxmlformats.org/officeDocument/2006/relationships" xmlns:p="http://schemas.openxmlformats.org/presentationml/2006/main">
+  <p:cSld>
+    <p:spTree>
+      <p:nvGrpSpPr>
+        <p:cNvPr id="1" name=""/>
+        <p:cNvGrpSpPr/>
+        <p:nvPr/>
+      </p:nvGrpSpPr>
+      <p:grpSpPr>
+        <a:xfrm>
+          <a:off x="0" y="0"/>
+          <a:ext cx="0" cy="0"/>
+          <a:chOff x="0" y="0"/>
+          <a:chExt cx="0" cy="0"/>
+        </a:xfrm>
+      </p:grpSpPr>
+      <p:sp>
+        <p:nvSpPr>
+          <p:cNvPr id="8" name="Rectangle 7">
+            <a:extLst>
+              <a:ext uri="{FF2B5EF4-FFF2-40B4-BE49-F238E27FC236}">
+                <a16:creationId xmlns:a16="http://schemas.microsoft.com/office/drawing/2014/main" id="{28AF59DB-4F9D-47B1-A0E4-86FCD58D7CF5}"/>
+              </a:ext>
+            </a:extLst>
+          </p:cNvPr>
+          <p:cNvSpPr/>
+          <p:nvPr/>
+        </p:nvSpPr>
+        <p:spPr>
+          <a:xfrm>
+            <a:off x="0" y="0"/>
+            <a:ext cx="12192000" cy="746449"/>
+          </a:xfrm>
+          <a:prstGeom prst="rect">
+            <a:avLst/>
+          </a:prstGeom>
+          <a:pattFill prst="pct70">
+            <a:fgClr>
+              <a:schemeClr val="accent6">
+                <a:lumMod val="60000"/>
+                <a:lumOff val="40000"/>
+              </a:schemeClr>
+            </a:fgClr>
+            <a:bgClr>
+              <a:schemeClr val="bg1"/>
+            </a:bgClr>
+          </a:pattFill>
+          <a:ln>
+            <a:noFill/>
+          </a:ln>
+        </p:spPr>
+        <p:style>
+          <a:lnRef idx="2">
+            <a:schemeClr val="accent1">
+              <a:shade val="50000"/>
+            </a:schemeClr>
+          </a:lnRef>
+          <a:fillRef idx="1">
+            <a:schemeClr val="accent1"/>
+          </a:fillRef>
+          <a:effectRef idx="0">
+            <a:schemeClr val="accent1"/>
+          </a:effectRef>
+          <a:fontRef idx="minor">
+            <a:schemeClr val="lt1"/>
+          </a:fontRef>
+        </p:style>
+        <p:txBody>
+          <a:bodyPr rtlCol="0" anchor="ctr"/>
+          <a:lstStyle/>
+          <a:p>
+            <a:pPr algn="ctr"/>
+            <a:r>
+              <a:rPr lang="en-US" sz="3200" dirty="0">
+                <a:solidFill>
+                  <a:schemeClr val="tx2"/>
+                </a:solidFill>
+              </a:rPr>
+              <a:t>Amide prediction of Norman RTIs</a:t>
+            </a:r>
+            <a:endParaRPr lang="en-US" sz="3200" i="1" dirty="0">
+              <a:solidFill>
+                <a:schemeClr val="tx2"/>
+              </a:solidFill>
+            </a:endParaRPr>
+          </a:p>
+        </p:txBody>
+      </p:sp>
+      <p:pic>
+        <p:nvPicPr>
+          <p:cNvPr id="5" name="Picture 4" descr="Chart, histogram&#10;&#10;Description automatically generated">
+            <a:extLst>
+              <a:ext uri="{FF2B5EF4-FFF2-40B4-BE49-F238E27FC236}">
+                <a16:creationId xmlns:a16="http://schemas.microsoft.com/office/drawing/2014/main" id="{19BAFBAF-96E2-41D4-AD1D-ADD50EE94513}"/>
+              </a:ext>
+            </a:extLst>
+          </p:cNvPr>
+          <p:cNvPicPr>
+            <a:picLocks noChangeAspect="1"/>
+          </p:cNvPicPr>
+          <p:nvPr/>
+        </p:nvPicPr>
+        <p:blipFill>
+          <a:blip r:embed="rId3">
+            <a:extLst>
+              <a:ext uri="{28A0092B-C50C-407E-A947-70E740481C1C}">
+                <a14:useLocalDpi xmlns:a14="http://schemas.microsoft.com/office/drawing/2010/main" val="0"/>
+              </a:ext>
+            </a:extLst>
+          </a:blip>
+          <a:stretch>
+            <a:fillRect/>
+          </a:stretch>
+        </p:blipFill>
+        <p:spPr>
+          <a:xfrm>
+            <a:off x="1078103" y="1182355"/>
+            <a:ext cx="7089113" cy="4726075"/>
+          </a:xfrm>
+          <a:prstGeom prst="rect">
+            <a:avLst/>
+          </a:prstGeom>
+        </p:spPr>
+      </p:pic>
+    </p:spTree>
+    <p:extLst>
+      <p:ext uri="{BB962C8B-B14F-4D97-AF65-F5344CB8AC3E}">
+        <p14:creationId xmlns:p14="http://schemas.microsoft.com/office/powerpoint/2010/main" val="912970659"/>
+      </p:ext>
+    </p:extLst>
+  </p:cSld>
+  <p:clrMapOvr>
+    <a:masterClrMapping/>
+  </p:clrMapOvr>
+</p:sld>
+</file>
+
+<file path=ppt/slides/slide22.xml><?xml version="1.0" encoding="utf-8"?>
+<p:sld xmlns:a="http://schemas.openxmlformats.org/drawingml/2006/main" xmlns:r="http://schemas.openxmlformats.org/officeDocument/2006/relationships" xmlns:p="http://schemas.openxmlformats.org/presentationml/2006/main">
+  <p:cSld>
+    <p:spTree>
+      <p:nvGrpSpPr>
+        <p:cNvPr id="1" name=""/>
+        <p:cNvGrpSpPr/>
+        <p:nvPr/>
+      </p:nvGrpSpPr>
+      <p:grpSpPr>
+        <a:xfrm>
+          <a:off x="0" y="0"/>
+          <a:ext cx="0" cy="0"/>
+          <a:chOff x="0" y="0"/>
+          <a:chExt cx="0" cy="0"/>
+        </a:xfrm>
+      </p:grpSpPr>
+      <p:sp>
+        <p:nvSpPr>
+          <p:cNvPr id="8" name="Rectangle 7">
+            <a:extLst>
+              <a:ext uri="{FF2B5EF4-FFF2-40B4-BE49-F238E27FC236}">
+                <a16:creationId xmlns:a16="http://schemas.microsoft.com/office/drawing/2014/main" id="{28AF59DB-4F9D-47B1-A0E4-86FCD58D7CF5}"/>
+              </a:ext>
+            </a:extLst>
+          </p:cNvPr>
+          <p:cNvSpPr/>
+          <p:nvPr/>
+        </p:nvSpPr>
+        <p:spPr>
+          <a:xfrm>
+            <a:off x="0" y="0"/>
+            <a:ext cx="12192000" cy="746449"/>
+          </a:xfrm>
+          <a:prstGeom prst="rect">
+            <a:avLst/>
+          </a:prstGeom>
+          <a:pattFill prst="pct70">
+            <a:fgClr>
+              <a:schemeClr val="accent6">
+                <a:lumMod val="60000"/>
+                <a:lumOff val="40000"/>
+              </a:schemeClr>
+            </a:fgClr>
+            <a:bgClr>
+              <a:schemeClr val="bg1"/>
+            </a:bgClr>
+          </a:pattFill>
+          <a:ln>
+            <a:noFill/>
+          </a:ln>
+        </p:spPr>
+        <p:style>
+          <a:lnRef idx="2">
+            <a:schemeClr val="accent1">
+              <a:shade val="50000"/>
+            </a:schemeClr>
+          </a:lnRef>
+          <a:fillRef idx="1">
+            <a:schemeClr val="accent1"/>
+          </a:fillRef>
+          <a:effectRef idx="0">
+            <a:schemeClr val="accent1"/>
+          </a:effectRef>
+          <a:fontRef idx="minor">
+            <a:schemeClr val="lt1"/>
+          </a:fontRef>
+        </p:style>
+        <p:txBody>
+          <a:bodyPr rtlCol="0" anchor="ctr"/>
+          <a:lstStyle/>
+          <a:p>
+            <a:pPr algn="ctr"/>
+            <a:r>
+              <a:rPr lang="en-US" sz="3200" dirty="0">
+                <a:solidFill>
+                  <a:schemeClr val="tx2"/>
+                </a:solidFill>
+              </a:rPr>
+              <a:t>Greek prediction of Norman RTIs</a:t>
+            </a:r>
+            <a:endParaRPr lang="en-US" sz="3200" i="1" dirty="0">
+              <a:solidFill>
+                <a:schemeClr val="tx2"/>
+              </a:solidFill>
+            </a:endParaRPr>
+          </a:p>
+        </p:txBody>
+      </p:sp>
+      <p:pic>
+        <p:nvPicPr>
+          <p:cNvPr id="5" name="Picture 4">
+            <a:extLst>
+              <a:ext uri="{FF2B5EF4-FFF2-40B4-BE49-F238E27FC236}">
+                <a16:creationId xmlns:a16="http://schemas.microsoft.com/office/drawing/2014/main" id="{19BAFBAF-96E2-41D4-AD1D-ADD50EE94513}"/>
+              </a:ext>
+            </a:extLst>
+          </p:cNvPr>
+          <p:cNvPicPr>
+            <a:picLocks noChangeAspect="1"/>
+          </p:cNvPicPr>
+          <p:nvPr/>
+        </p:nvPicPr>
+        <p:blipFill>
+          <a:blip r:embed="rId3">
+            <a:extLst>
+              <a:ext uri="{28A0092B-C50C-407E-A947-70E740481C1C}">
+                <a14:useLocalDpi xmlns:a14="http://schemas.microsoft.com/office/drawing/2010/main" val="0"/>
+              </a:ext>
+            </a:extLst>
+          </a:blip>
+          <a:srcRect/>
+          <a:stretch/>
+        </p:blipFill>
+        <p:spPr>
+          <a:xfrm>
+            <a:off x="1078103" y="1182355"/>
+            <a:ext cx="7089112" cy="4726075"/>
+          </a:xfrm>
+          <a:prstGeom prst="rect">
+            <a:avLst/>
+          </a:prstGeom>
+        </p:spPr>
+      </p:pic>
+    </p:spTree>
+    <p:extLst>
+      <p:ext uri="{BB962C8B-B14F-4D97-AF65-F5344CB8AC3E}">
+        <p14:creationId xmlns:p14="http://schemas.microsoft.com/office/powerpoint/2010/main" val="1784348181"/>
+      </p:ext>
+    </p:extLst>
+  </p:cSld>
+  <p:clrMapOvr>
+    <a:masterClrMapping/>
+  </p:clrMapOvr>
+</p:sld>
+</file>
+
 <file path=ppt/slides/slide3.xml><?xml version="1.0" encoding="utf-8"?>
 <p:sld xmlns:a="http://schemas.openxmlformats.org/drawingml/2006/main" xmlns:r="http://schemas.openxmlformats.org/officeDocument/2006/relationships" xmlns:p="http://schemas.openxmlformats.org/presentationml/2006/main">
   <p:cSld>

</xml_diff>

<commit_message>
HiLo distributions + boxplots
</commit_message>
<xml_diff>
--- a/Future presentation update.pptx
+++ b/Future presentation update.pptx
@@ -5,7 +5,7 @@
     <p:sldMasterId id="2147483648" r:id="rId1"/>
   </p:sldMasterIdLst>
   <p:notesMasterIdLst>
-    <p:notesMasterId r:id="rId26"/>
+    <p:notesMasterId r:id="rId28"/>
   </p:notesMasterIdLst>
   <p:sldIdLst>
     <p:sldId id="275" r:id="rId2"/>
@@ -32,6 +32,8 @@
     <p:sldId id="288" r:id="rId23"/>
     <p:sldId id="287" r:id="rId24"/>
     <p:sldId id="289" r:id="rId25"/>
+    <p:sldId id="290" r:id="rId26"/>
+    <p:sldId id="291" r:id="rId27"/>
   </p:sldIdLst>
   <p:sldSz cx="12192000" cy="6858000"/>
   <p:notesSz cx="6858000" cy="9144000"/>
@@ -231,7 +233,7 @@
           <a:p>
             <a:fld id="{D89C509C-F59B-43AF-A9EE-F3A414EAAE56}" type="datetimeFigureOut">
               <a:rPr lang="en-US" smtClean="0"/>
-              <a:t>6/6/2022</a:t>
+              <a:t>6/7/2022</a:t>
             </a:fld>
             <a:endParaRPr lang="en-US"/>
           </a:p>
@@ -582,6 +584,174 @@
 </p:notes>
 </file>
 
+<file path=ppt/notesSlides/notesSlide10.xml><?xml version="1.0" encoding="utf-8"?>
+<p:notes xmlns:a="http://schemas.openxmlformats.org/drawingml/2006/main" xmlns:r="http://schemas.openxmlformats.org/officeDocument/2006/relationships" xmlns:p="http://schemas.openxmlformats.org/presentationml/2006/main">
+  <p:cSld>
+    <p:spTree>
+      <p:nvGrpSpPr>
+        <p:cNvPr id="1" name=""/>
+        <p:cNvGrpSpPr/>
+        <p:nvPr/>
+      </p:nvGrpSpPr>
+      <p:grpSpPr>
+        <a:xfrm>
+          <a:off x="0" y="0"/>
+          <a:ext cx="0" cy="0"/>
+          <a:chOff x="0" y="0"/>
+          <a:chExt cx="0" cy="0"/>
+        </a:xfrm>
+      </p:grpSpPr>
+      <p:sp>
+        <p:nvSpPr>
+          <p:cNvPr id="2" name="Slide Image Placeholder 1"/>
+          <p:cNvSpPr>
+            <a:spLocks noGrp="1" noRot="1" noChangeAspect="1"/>
+          </p:cNvSpPr>
+          <p:nvPr>
+            <p:ph type="sldImg"/>
+          </p:nvPr>
+        </p:nvSpPr>
+        <p:spPr/>
+      </p:sp>
+      <p:sp>
+        <p:nvSpPr>
+          <p:cNvPr id="3" name="Notes Placeholder 2"/>
+          <p:cNvSpPr>
+            <a:spLocks noGrp="1"/>
+          </p:cNvSpPr>
+          <p:nvPr>
+            <p:ph type="body" idx="1"/>
+          </p:nvPr>
+        </p:nvSpPr>
+        <p:spPr/>
+        <p:txBody>
+          <a:bodyPr/>
+          <a:lstStyle/>
+          <a:p>
+            <a:endParaRPr lang="en-US" dirty="0"/>
+          </a:p>
+        </p:txBody>
+      </p:sp>
+      <p:sp>
+        <p:nvSpPr>
+          <p:cNvPr id="4" name="Slide Number Placeholder 3"/>
+          <p:cNvSpPr>
+            <a:spLocks noGrp="1"/>
+          </p:cNvSpPr>
+          <p:nvPr>
+            <p:ph type="sldNum" sz="quarter" idx="5"/>
+          </p:nvPr>
+        </p:nvSpPr>
+        <p:spPr/>
+        <p:txBody>
+          <a:bodyPr/>
+          <a:lstStyle/>
+          <a:p>
+            <a:fld id="{1FFC93A7-B1F3-454A-A230-F9074DA5B0F9}" type="slidenum">
+              <a:rPr lang="en-US" smtClean="0"/>
+              <a:t>25</a:t>
+            </a:fld>
+            <a:endParaRPr lang="en-US"/>
+          </a:p>
+        </p:txBody>
+      </p:sp>
+    </p:spTree>
+    <p:extLst>
+      <p:ext uri="{BB962C8B-B14F-4D97-AF65-F5344CB8AC3E}">
+        <p14:creationId xmlns:p14="http://schemas.microsoft.com/office/powerpoint/2010/main" val="3610269085"/>
+      </p:ext>
+    </p:extLst>
+  </p:cSld>
+  <p:clrMapOvr>
+    <a:masterClrMapping/>
+  </p:clrMapOvr>
+</p:notes>
+</file>
+
+<file path=ppt/notesSlides/notesSlide11.xml><?xml version="1.0" encoding="utf-8"?>
+<p:notes xmlns:a="http://schemas.openxmlformats.org/drawingml/2006/main" xmlns:r="http://schemas.openxmlformats.org/officeDocument/2006/relationships" xmlns:p="http://schemas.openxmlformats.org/presentationml/2006/main">
+  <p:cSld>
+    <p:spTree>
+      <p:nvGrpSpPr>
+        <p:cNvPr id="1" name=""/>
+        <p:cNvGrpSpPr/>
+        <p:nvPr/>
+      </p:nvGrpSpPr>
+      <p:grpSpPr>
+        <a:xfrm>
+          <a:off x="0" y="0"/>
+          <a:ext cx="0" cy="0"/>
+          <a:chOff x="0" y="0"/>
+          <a:chExt cx="0" cy="0"/>
+        </a:xfrm>
+      </p:grpSpPr>
+      <p:sp>
+        <p:nvSpPr>
+          <p:cNvPr id="2" name="Slide Image Placeholder 1"/>
+          <p:cNvSpPr>
+            <a:spLocks noGrp="1" noRot="1" noChangeAspect="1"/>
+          </p:cNvSpPr>
+          <p:nvPr>
+            <p:ph type="sldImg"/>
+          </p:nvPr>
+        </p:nvSpPr>
+        <p:spPr/>
+      </p:sp>
+      <p:sp>
+        <p:nvSpPr>
+          <p:cNvPr id="3" name="Notes Placeholder 2"/>
+          <p:cNvSpPr>
+            <a:spLocks noGrp="1"/>
+          </p:cNvSpPr>
+          <p:nvPr>
+            <p:ph type="body" idx="1"/>
+          </p:nvPr>
+        </p:nvSpPr>
+        <p:spPr/>
+        <p:txBody>
+          <a:bodyPr/>
+          <a:lstStyle/>
+          <a:p>
+            <a:endParaRPr lang="en-US" dirty="0"/>
+          </a:p>
+        </p:txBody>
+      </p:sp>
+      <p:sp>
+        <p:nvSpPr>
+          <p:cNvPr id="4" name="Slide Number Placeholder 3"/>
+          <p:cNvSpPr>
+            <a:spLocks noGrp="1"/>
+          </p:cNvSpPr>
+          <p:nvPr>
+            <p:ph type="sldNum" sz="quarter" idx="5"/>
+          </p:nvPr>
+        </p:nvSpPr>
+        <p:spPr/>
+        <p:txBody>
+          <a:bodyPr/>
+          <a:lstStyle/>
+          <a:p>
+            <a:fld id="{1FFC93A7-B1F3-454A-A230-F9074DA5B0F9}" type="slidenum">
+              <a:rPr lang="en-US" smtClean="0"/>
+              <a:t>26</a:t>
+            </a:fld>
+            <a:endParaRPr lang="en-US"/>
+          </a:p>
+        </p:txBody>
+      </p:sp>
+    </p:spTree>
+    <p:extLst>
+      <p:ext uri="{BB962C8B-B14F-4D97-AF65-F5344CB8AC3E}">
+        <p14:creationId xmlns:p14="http://schemas.microsoft.com/office/powerpoint/2010/main" val="4197404588"/>
+      </p:ext>
+    </p:extLst>
+  </p:cSld>
+  <p:clrMapOvr>
+    <a:masterClrMapping/>
+  </p:clrMapOvr>
+</p:notes>
+</file>
+
 <file path=ppt/notesSlides/notesSlide2.xml><?xml version="1.0" encoding="utf-8"?>
 <p:notes xmlns:a="http://schemas.openxmlformats.org/drawingml/2006/main" xmlns:r="http://schemas.openxmlformats.org/officeDocument/2006/relationships" xmlns:p="http://schemas.openxmlformats.org/presentationml/2006/main">
   <p:cSld>
@@ -1481,7 +1651,7 @@
           <a:p>
             <a:fld id="{C0000475-B398-4327-8963-A9A1B862D0B5}" type="datetimeFigureOut">
               <a:rPr lang="en-US" smtClean="0"/>
-              <a:t>6/6/2022</a:t>
+              <a:t>6/7/2022</a:t>
             </a:fld>
             <a:endParaRPr lang="en-US"/>
           </a:p>
@@ -1679,7 +1849,7 @@
           <a:p>
             <a:fld id="{C0000475-B398-4327-8963-A9A1B862D0B5}" type="datetimeFigureOut">
               <a:rPr lang="en-US" smtClean="0"/>
-              <a:t>6/6/2022</a:t>
+              <a:t>6/7/2022</a:t>
             </a:fld>
             <a:endParaRPr lang="en-US"/>
           </a:p>
@@ -1887,7 +2057,7 @@
           <a:p>
             <a:fld id="{C0000475-B398-4327-8963-A9A1B862D0B5}" type="datetimeFigureOut">
               <a:rPr lang="en-US" smtClean="0"/>
-              <a:t>6/6/2022</a:t>
+              <a:t>6/7/2022</a:t>
             </a:fld>
             <a:endParaRPr lang="en-US"/>
           </a:p>
@@ -2085,7 +2255,7 @@
           <a:p>
             <a:fld id="{C0000475-B398-4327-8963-A9A1B862D0B5}" type="datetimeFigureOut">
               <a:rPr lang="en-US" smtClean="0"/>
-              <a:t>6/6/2022</a:t>
+              <a:t>6/7/2022</a:t>
             </a:fld>
             <a:endParaRPr lang="en-US"/>
           </a:p>
@@ -2360,7 +2530,7 @@
           <a:p>
             <a:fld id="{C0000475-B398-4327-8963-A9A1B862D0B5}" type="datetimeFigureOut">
               <a:rPr lang="en-US" smtClean="0"/>
-              <a:t>6/6/2022</a:t>
+              <a:t>6/7/2022</a:t>
             </a:fld>
             <a:endParaRPr lang="en-US"/>
           </a:p>
@@ -2625,7 +2795,7 @@
           <a:p>
             <a:fld id="{C0000475-B398-4327-8963-A9A1B862D0B5}" type="datetimeFigureOut">
               <a:rPr lang="en-US" smtClean="0"/>
-              <a:t>6/6/2022</a:t>
+              <a:t>6/7/2022</a:t>
             </a:fld>
             <a:endParaRPr lang="en-US"/>
           </a:p>
@@ -3037,7 +3207,7 @@
           <a:p>
             <a:fld id="{C0000475-B398-4327-8963-A9A1B862D0B5}" type="datetimeFigureOut">
               <a:rPr lang="en-US" smtClean="0"/>
-              <a:t>6/6/2022</a:t>
+              <a:t>6/7/2022</a:t>
             </a:fld>
             <a:endParaRPr lang="en-US"/>
           </a:p>
@@ -3178,7 +3348,7 @@
           <a:p>
             <a:fld id="{C0000475-B398-4327-8963-A9A1B862D0B5}" type="datetimeFigureOut">
               <a:rPr lang="en-US" smtClean="0"/>
-              <a:t>6/6/2022</a:t>
+              <a:t>6/7/2022</a:t>
             </a:fld>
             <a:endParaRPr lang="en-US"/>
           </a:p>
@@ -3291,7 +3461,7 @@
           <a:p>
             <a:fld id="{C0000475-B398-4327-8963-A9A1B862D0B5}" type="datetimeFigureOut">
               <a:rPr lang="en-US" smtClean="0"/>
-              <a:t>6/6/2022</a:t>
+              <a:t>6/7/2022</a:t>
             </a:fld>
             <a:endParaRPr lang="en-US"/>
           </a:p>
@@ -3602,7 +3772,7 @@
           <a:p>
             <a:fld id="{C0000475-B398-4327-8963-A9A1B862D0B5}" type="datetimeFigureOut">
               <a:rPr lang="en-US" smtClean="0"/>
-              <a:t>6/6/2022</a:t>
+              <a:t>6/7/2022</a:t>
             </a:fld>
             <a:endParaRPr lang="en-US"/>
           </a:p>
@@ -3890,7 +4060,7 @@
           <a:p>
             <a:fld id="{C0000475-B398-4327-8963-A9A1B862D0B5}" type="datetimeFigureOut">
               <a:rPr lang="en-US" smtClean="0"/>
-              <a:t>6/6/2022</a:t>
+              <a:t>6/7/2022</a:t>
             </a:fld>
             <a:endParaRPr lang="en-US"/>
           </a:p>
@@ -4142,7 +4312,7 @@
           <a:p>
             <a:fld id="{C0000475-B398-4327-8963-A9A1B862D0B5}" type="datetimeFigureOut">
               <a:rPr lang="en-US" smtClean="0"/>
-              <a:t>6/6/2022</a:t>
+              <a:t>6/7/2022</a:t>
             </a:fld>
             <a:endParaRPr lang="en-US"/>
           </a:p>
@@ -13282,7 +13452,7 @@
           <a:p>
             <a:r>
               <a:rPr lang="en-US" sz="2400" dirty="0"/>
-              <a:t>Cross validation 5-fold average = 0.71</a:t>
+              <a:t>Cross validation 5-fold average = 0.70</a:t>
             </a:r>
           </a:p>
         </p:txBody>
@@ -15862,7 +16032,7 @@
                   <a:schemeClr val="tx2"/>
                 </a:solidFill>
               </a:rPr>
-              <a:t>Amide- </a:t>
+              <a:t>Amide </a:t>
             </a:r>
             <a:r>
               <a:rPr lang="en-US" sz="3200" dirty="0" err="1">
@@ -15919,7 +16089,7 @@
             <a:pPr algn="ctr"/>
             <a:r>
               <a:rPr lang="en-US" sz="2800" dirty="0"/>
-              <a:t>Lowest point 255.8</a:t>
+              <a:t>Lowest point 255.6</a:t>
             </a:r>
           </a:p>
         </p:txBody>
@@ -16294,6 +16464,524 @@
     <p:extLst>
       <p:ext uri="{BB962C8B-B14F-4D97-AF65-F5344CB8AC3E}">
         <p14:creationId xmlns:p14="http://schemas.microsoft.com/office/powerpoint/2010/main" val="1649422602"/>
+      </p:ext>
+    </p:extLst>
+  </p:cSld>
+  <p:clrMapOvr>
+    <a:masterClrMapping/>
+  </p:clrMapOvr>
+</p:sld>
+</file>
+
+<file path=ppt/slides/slide25.xml><?xml version="1.0" encoding="utf-8"?>
+<p:sld xmlns:a="http://schemas.openxmlformats.org/drawingml/2006/main" xmlns:r="http://schemas.openxmlformats.org/officeDocument/2006/relationships" xmlns:p="http://schemas.openxmlformats.org/presentationml/2006/main">
+  <p:cSld>
+    <p:spTree>
+      <p:nvGrpSpPr>
+        <p:cNvPr id="1" name=""/>
+        <p:cNvGrpSpPr/>
+        <p:nvPr/>
+      </p:nvGrpSpPr>
+      <p:grpSpPr>
+        <a:xfrm>
+          <a:off x="0" y="0"/>
+          <a:ext cx="0" cy="0"/>
+          <a:chOff x="0" y="0"/>
+          <a:chExt cx="0" cy="0"/>
+        </a:xfrm>
+      </p:grpSpPr>
+      <p:sp>
+        <p:nvSpPr>
+          <p:cNvPr id="8" name="Rectangle 7">
+            <a:extLst>
+              <a:ext uri="{FF2B5EF4-FFF2-40B4-BE49-F238E27FC236}">
+                <a16:creationId xmlns:a16="http://schemas.microsoft.com/office/drawing/2014/main" id="{28AF59DB-4F9D-47B1-A0E4-86FCD58D7CF5}"/>
+              </a:ext>
+            </a:extLst>
+          </p:cNvPr>
+          <p:cNvSpPr/>
+          <p:nvPr/>
+        </p:nvSpPr>
+        <p:spPr>
+          <a:xfrm>
+            <a:off x="0" y="0"/>
+            <a:ext cx="12192000" cy="746449"/>
+          </a:xfrm>
+          <a:prstGeom prst="rect">
+            <a:avLst/>
+          </a:prstGeom>
+          <a:pattFill prst="pct70">
+            <a:fgClr>
+              <a:schemeClr val="accent6">
+                <a:lumMod val="60000"/>
+                <a:lumOff val="40000"/>
+              </a:schemeClr>
+            </a:fgClr>
+            <a:bgClr>
+              <a:schemeClr val="bg1"/>
+            </a:bgClr>
+          </a:pattFill>
+          <a:ln>
+            <a:noFill/>
+          </a:ln>
+        </p:spPr>
+        <p:style>
+          <a:lnRef idx="2">
+            <a:schemeClr val="accent1">
+              <a:shade val="50000"/>
+            </a:schemeClr>
+          </a:lnRef>
+          <a:fillRef idx="1">
+            <a:schemeClr val="accent1"/>
+          </a:fillRef>
+          <a:effectRef idx="0">
+            <a:schemeClr val="accent1"/>
+          </a:effectRef>
+          <a:fontRef idx="minor">
+            <a:schemeClr val="lt1"/>
+          </a:fontRef>
+        </p:style>
+        <p:txBody>
+          <a:bodyPr rtlCol="0" anchor="ctr"/>
+          <a:lstStyle/>
+          <a:p>
+            <a:pPr algn="ctr"/>
+            <a:r>
+              <a:rPr lang="en-US" sz="3200" dirty="0">
+                <a:solidFill>
+                  <a:schemeClr val="tx2"/>
+                </a:solidFill>
+              </a:rPr>
+              <a:t>Amide </a:t>
+            </a:r>
+            <a:r>
+              <a:rPr lang="en-US" sz="3200" dirty="0" err="1">
+                <a:solidFill>
+                  <a:schemeClr val="tx2"/>
+                </a:solidFill>
+              </a:rPr>
+              <a:t>LoHi</a:t>
+            </a:r>
+            <a:r>
+              <a:rPr lang="en-US" sz="3200" dirty="0">
+                <a:solidFill>
+                  <a:schemeClr val="tx2"/>
+                </a:solidFill>
+              </a:rPr>
+              <a:t> Boxplots</a:t>
+            </a:r>
+            <a:endParaRPr lang="en-US" sz="3200" i="1" dirty="0">
+              <a:solidFill>
+                <a:schemeClr val="tx2"/>
+              </a:solidFill>
+            </a:endParaRPr>
+          </a:p>
+        </p:txBody>
+      </p:sp>
+      <p:sp>
+        <p:nvSpPr>
+          <p:cNvPr id="2" name="TextBox 1">
+            <a:extLst>
+              <a:ext uri="{FF2B5EF4-FFF2-40B4-BE49-F238E27FC236}">
+                <a16:creationId xmlns:a16="http://schemas.microsoft.com/office/drawing/2014/main" id="{B5EFEFE8-2BA8-49B5-834C-B30B82E21059}"/>
+              </a:ext>
+            </a:extLst>
+          </p:cNvPr>
+          <p:cNvSpPr txBox="1"/>
+          <p:nvPr/>
+        </p:nvSpPr>
+        <p:spPr>
+          <a:xfrm>
+            <a:off x="1629716" y="1113953"/>
+            <a:ext cx="2963568" cy="523220"/>
+          </a:xfrm>
+          <a:prstGeom prst="rect">
+            <a:avLst/>
+          </a:prstGeom>
+          <a:noFill/>
+        </p:spPr>
+        <p:txBody>
+          <a:bodyPr wrap="none" rtlCol="0">
+            <a:spAutoFit/>
+          </a:bodyPr>
+          <a:lstStyle/>
+          <a:p>
+            <a:pPr algn="ctr"/>
+            <a:r>
+              <a:rPr lang="en-US" sz="2800" dirty="0"/>
+              <a:t>Lowest point 255.6</a:t>
+            </a:r>
+          </a:p>
+        </p:txBody>
+      </p:sp>
+      <p:sp>
+        <p:nvSpPr>
+          <p:cNvPr id="6" name="TextBox 5">
+            <a:extLst>
+              <a:ext uri="{FF2B5EF4-FFF2-40B4-BE49-F238E27FC236}">
+                <a16:creationId xmlns:a16="http://schemas.microsoft.com/office/drawing/2014/main" id="{DCBC0F18-8E6A-4CE9-934B-A937642E50A4}"/>
+              </a:ext>
+            </a:extLst>
+          </p:cNvPr>
+          <p:cNvSpPr txBox="1"/>
+          <p:nvPr/>
+        </p:nvSpPr>
+        <p:spPr>
+          <a:xfrm>
+            <a:off x="7562777" y="1206173"/>
+            <a:ext cx="3035446" cy="523220"/>
+          </a:xfrm>
+          <a:prstGeom prst="rect">
+            <a:avLst/>
+          </a:prstGeom>
+          <a:noFill/>
+        </p:spPr>
+        <p:txBody>
+          <a:bodyPr wrap="none" rtlCol="0">
+            <a:spAutoFit/>
+          </a:bodyPr>
+          <a:lstStyle/>
+          <a:p>
+            <a:r>
+              <a:rPr lang="en-US" sz="2800" dirty="0"/>
+              <a:t>Highest point 968.9</a:t>
+            </a:r>
+          </a:p>
+        </p:txBody>
+      </p:sp>
+      <p:pic>
+        <p:nvPicPr>
+          <p:cNvPr id="4" name="Picture 3">
+            <a:extLst>
+              <a:ext uri="{FF2B5EF4-FFF2-40B4-BE49-F238E27FC236}">
+                <a16:creationId xmlns:a16="http://schemas.microsoft.com/office/drawing/2014/main" id="{124C944A-0E38-46D6-963A-B22D247AFBCB}"/>
+              </a:ext>
+            </a:extLst>
+          </p:cNvPr>
+          <p:cNvPicPr>
+            <a:picLocks noChangeAspect="1"/>
+          </p:cNvPicPr>
+          <p:nvPr/>
+        </p:nvPicPr>
+        <p:blipFill>
+          <a:blip r:embed="rId3">
+            <a:extLst>
+              <a:ext uri="{28A0092B-C50C-407E-A947-70E740481C1C}">
+                <a14:useLocalDpi xmlns:a14="http://schemas.microsoft.com/office/drawing/2010/main" val="0"/>
+              </a:ext>
+            </a:extLst>
+          </a:blip>
+          <a:srcRect/>
+          <a:stretch/>
+        </p:blipFill>
+        <p:spPr>
+          <a:xfrm>
+            <a:off x="254000" y="2004677"/>
+            <a:ext cx="5715000" cy="3810000"/>
+          </a:xfrm>
+          <a:prstGeom prst="rect">
+            <a:avLst/>
+          </a:prstGeom>
+        </p:spPr>
+      </p:pic>
+      <p:pic>
+        <p:nvPicPr>
+          <p:cNvPr id="9" name="Picture 8">
+            <a:extLst>
+              <a:ext uri="{FF2B5EF4-FFF2-40B4-BE49-F238E27FC236}">
+                <a16:creationId xmlns:a16="http://schemas.microsoft.com/office/drawing/2014/main" id="{C68408FD-E86F-4F29-BFCC-824EB9695EC4}"/>
+              </a:ext>
+            </a:extLst>
+          </p:cNvPr>
+          <p:cNvPicPr>
+            <a:picLocks noChangeAspect="1"/>
+          </p:cNvPicPr>
+          <p:nvPr/>
+        </p:nvPicPr>
+        <p:blipFill>
+          <a:blip r:embed="rId4">
+            <a:extLst>
+              <a:ext uri="{28A0092B-C50C-407E-A947-70E740481C1C}">
+                <a14:useLocalDpi xmlns:a14="http://schemas.microsoft.com/office/drawing/2010/main" val="0"/>
+              </a:ext>
+            </a:extLst>
+          </a:blip>
+          <a:srcRect/>
+          <a:stretch/>
+        </p:blipFill>
+        <p:spPr>
+          <a:xfrm>
+            <a:off x="6223002" y="2004677"/>
+            <a:ext cx="5715000" cy="3810000"/>
+          </a:xfrm>
+          <a:prstGeom prst="rect">
+            <a:avLst/>
+          </a:prstGeom>
+        </p:spPr>
+      </p:pic>
+    </p:spTree>
+    <p:extLst>
+      <p:ext uri="{BB962C8B-B14F-4D97-AF65-F5344CB8AC3E}">
+        <p14:creationId xmlns:p14="http://schemas.microsoft.com/office/powerpoint/2010/main" val="1322119850"/>
+      </p:ext>
+    </p:extLst>
+  </p:cSld>
+  <p:clrMapOvr>
+    <a:masterClrMapping/>
+  </p:clrMapOvr>
+</p:sld>
+</file>
+
+<file path=ppt/slides/slide26.xml><?xml version="1.0" encoding="utf-8"?>
+<p:sld xmlns:a="http://schemas.openxmlformats.org/drawingml/2006/main" xmlns:r="http://schemas.openxmlformats.org/officeDocument/2006/relationships" xmlns:p="http://schemas.openxmlformats.org/presentationml/2006/main">
+  <p:cSld>
+    <p:spTree>
+      <p:nvGrpSpPr>
+        <p:cNvPr id="1" name=""/>
+        <p:cNvGrpSpPr/>
+        <p:nvPr/>
+      </p:nvGrpSpPr>
+      <p:grpSpPr>
+        <a:xfrm>
+          <a:off x="0" y="0"/>
+          <a:ext cx="0" cy="0"/>
+          <a:chOff x="0" y="0"/>
+          <a:chExt cx="0" cy="0"/>
+        </a:xfrm>
+      </p:grpSpPr>
+      <p:sp>
+        <p:nvSpPr>
+          <p:cNvPr id="8" name="Rectangle 7">
+            <a:extLst>
+              <a:ext uri="{FF2B5EF4-FFF2-40B4-BE49-F238E27FC236}">
+                <a16:creationId xmlns:a16="http://schemas.microsoft.com/office/drawing/2014/main" id="{28AF59DB-4F9D-47B1-A0E4-86FCD58D7CF5}"/>
+              </a:ext>
+            </a:extLst>
+          </p:cNvPr>
+          <p:cNvSpPr/>
+          <p:nvPr/>
+        </p:nvSpPr>
+        <p:spPr>
+          <a:xfrm>
+            <a:off x="0" y="0"/>
+            <a:ext cx="12192000" cy="746449"/>
+          </a:xfrm>
+          <a:prstGeom prst="rect">
+            <a:avLst/>
+          </a:prstGeom>
+          <a:pattFill prst="pct70">
+            <a:fgClr>
+              <a:schemeClr val="accent6">
+                <a:lumMod val="60000"/>
+                <a:lumOff val="40000"/>
+              </a:schemeClr>
+            </a:fgClr>
+            <a:bgClr>
+              <a:schemeClr val="bg1"/>
+            </a:bgClr>
+          </a:pattFill>
+          <a:ln>
+            <a:noFill/>
+          </a:ln>
+        </p:spPr>
+        <p:style>
+          <a:lnRef idx="2">
+            <a:schemeClr val="accent1">
+              <a:shade val="50000"/>
+            </a:schemeClr>
+          </a:lnRef>
+          <a:fillRef idx="1">
+            <a:schemeClr val="accent1"/>
+          </a:fillRef>
+          <a:effectRef idx="0">
+            <a:schemeClr val="accent1"/>
+          </a:effectRef>
+          <a:fontRef idx="minor">
+            <a:schemeClr val="lt1"/>
+          </a:fontRef>
+        </p:style>
+        <p:txBody>
+          <a:bodyPr rtlCol="0" anchor="ctr"/>
+          <a:lstStyle/>
+          <a:p>
+            <a:pPr algn="ctr"/>
+            <a:r>
+              <a:rPr lang="en-US" sz="3200" dirty="0">
+                <a:solidFill>
+                  <a:schemeClr val="tx2"/>
+                </a:solidFill>
+              </a:rPr>
+              <a:t>Greek </a:t>
+            </a:r>
+            <a:r>
+              <a:rPr lang="en-US" sz="3200" dirty="0" err="1">
+                <a:solidFill>
+                  <a:schemeClr val="tx2"/>
+                </a:solidFill>
+              </a:rPr>
+              <a:t>LoHi</a:t>
+            </a:r>
+            <a:r>
+              <a:rPr lang="en-US" sz="3200" dirty="0">
+                <a:solidFill>
+                  <a:schemeClr val="tx2"/>
+                </a:solidFill>
+              </a:rPr>
+              <a:t> Boxplots</a:t>
+            </a:r>
+            <a:endParaRPr lang="en-US" sz="3200" i="1" dirty="0">
+              <a:solidFill>
+                <a:schemeClr val="tx2"/>
+              </a:solidFill>
+            </a:endParaRPr>
+          </a:p>
+        </p:txBody>
+      </p:sp>
+      <p:sp>
+        <p:nvSpPr>
+          <p:cNvPr id="2" name="TextBox 1">
+            <a:extLst>
+              <a:ext uri="{FF2B5EF4-FFF2-40B4-BE49-F238E27FC236}">
+                <a16:creationId xmlns:a16="http://schemas.microsoft.com/office/drawing/2014/main" id="{B5EFEFE8-2BA8-49B5-834C-B30B82E21059}"/>
+              </a:ext>
+            </a:extLst>
+          </p:cNvPr>
+          <p:cNvSpPr txBox="1"/>
+          <p:nvPr/>
+        </p:nvSpPr>
+        <p:spPr>
+          <a:xfrm>
+            <a:off x="1721087" y="1113953"/>
+            <a:ext cx="2780826" cy="523220"/>
+          </a:xfrm>
+          <a:prstGeom prst="rect">
+            <a:avLst/>
+          </a:prstGeom>
+          <a:noFill/>
+        </p:spPr>
+        <p:txBody>
+          <a:bodyPr wrap="none" rtlCol="0">
+            <a:spAutoFit/>
+          </a:bodyPr>
+          <a:lstStyle/>
+          <a:p>
+            <a:pPr algn="ctr"/>
+            <a:r>
+              <a:rPr lang="en-US" sz="2800" dirty="0"/>
+              <a:t>Lowest point 32.5</a:t>
+            </a:r>
+          </a:p>
+        </p:txBody>
+      </p:sp>
+      <p:sp>
+        <p:nvSpPr>
+          <p:cNvPr id="6" name="TextBox 5">
+            <a:extLst>
+              <a:ext uri="{FF2B5EF4-FFF2-40B4-BE49-F238E27FC236}">
+                <a16:creationId xmlns:a16="http://schemas.microsoft.com/office/drawing/2014/main" id="{DCBC0F18-8E6A-4CE9-934B-A937642E50A4}"/>
+              </a:ext>
+            </a:extLst>
+          </p:cNvPr>
+          <p:cNvSpPr txBox="1"/>
+          <p:nvPr/>
+        </p:nvSpPr>
+        <p:spPr>
+          <a:xfrm>
+            <a:off x="7562777" y="1206173"/>
+            <a:ext cx="3035446" cy="523220"/>
+          </a:xfrm>
+          <a:prstGeom prst="rect">
+            <a:avLst/>
+          </a:prstGeom>
+          <a:noFill/>
+        </p:spPr>
+        <p:txBody>
+          <a:bodyPr wrap="none" rtlCol="0">
+            <a:spAutoFit/>
+          </a:bodyPr>
+          <a:lstStyle/>
+          <a:p>
+            <a:r>
+              <a:rPr lang="en-US" sz="2800" dirty="0"/>
+              <a:t>Highest point 910.2</a:t>
+            </a:r>
+          </a:p>
+        </p:txBody>
+      </p:sp>
+      <p:pic>
+        <p:nvPicPr>
+          <p:cNvPr id="4" name="Picture 3">
+            <a:extLst>
+              <a:ext uri="{FF2B5EF4-FFF2-40B4-BE49-F238E27FC236}">
+                <a16:creationId xmlns:a16="http://schemas.microsoft.com/office/drawing/2014/main" id="{124C944A-0E38-46D6-963A-B22D247AFBCB}"/>
+              </a:ext>
+            </a:extLst>
+          </p:cNvPr>
+          <p:cNvPicPr>
+            <a:picLocks noChangeAspect="1"/>
+          </p:cNvPicPr>
+          <p:nvPr/>
+        </p:nvPicPr>
+        <p:blipFill>
+          <a:blip r:embed="rId3">
+            <a:extLst>
+              <a:ext uri="{28A0092B-C50C-407E-A947-70E740481C1C}">
+                <a14:useLocalDpi xmlns:a14="http://schemas.microsoft.com/office/drawing/2010/main" val="0"/>
+              </a:ext>
+            </a:extLst>
+          </a:blip>
+          <a:srcRect/>
+          <a:stretch/>
+        </p:blipFill>
+        <p:spPr>
+          <a:xfrm>
+            <a:off x="6223000" y="2004677"/>
+            <a:ext cx="5715000" cy="3810000"/>
+          </a:xfrm>
+          <a:prstGeom prst="rect">
+            <a:avLst/>
+          </a:prstGeom>
+        </p:spPr>
+      </p:pic>
+      <p:pic>
+        <p:nvPicPr>
+          <p:cNvPr id="9" name="Picture 8">
+            <a:extLst>
+              <a:ext uri="{FF2B5EF4-FFF2-40B4-BE49-F238E27FC236}">
+                <a16:creationId xmlns:a16="http://schemas.microsoft.com/office/drawing/2014/main" id="{C68408FD-E86F-4F29-BFCC-824EB9695EC4}"/>
+              </a:ext>
+            </a:extLst>
+          </p:cNvPr>
+          <p:cNvPicPr>
+            <a:picLocks noChangeAspect="1"/>
+          </p:cNvPicPr>
+          <p:nvPr/>
+        </p:nvPicPr>
+        <p:blipFill>
+          <a:blip r:embed="rId4">
+            <a:extLst>
+              <a:ext uri="{28A0092B-C50C-407E-A947-70E740481C1C}">
+                <a14:useLocalDpi xmlns:a14="http://schemas.microsoft.com/office/drawing/2010/main" val="0"/>
+              </a:ext>
+            </a:extLst>
+          </a:blip>
+          <a:srcRect/>
+          <a:stretch/>
+        </p:blipFill>
+        <p:spPr>
+          <a:xfrm>
+            <a:off x="254000" y="2004677"/>
+            <a:ext cx="5715000" cy="3810000"/>
+          </a:xfrm>
+          <a:prstGeom prst="rect">
+            <a:avLst/>
+          </a:prstGeom>
+        </p:spPr>
+      </p:pic>
+    </p:spTree>
+    <p:extLst>
+      <p:ext uri="{BB962C8B-B14F-4D97-AF65-F5344CB8AC3E}">
+        <p14:creationId xmlns:p14="http://schemas.microsoft.com/office/powerpoint/2010/main" val="4071867874"/>
       </p:ext>
     </p:extLst>
   </p:cSld>

</xml_diff>